<commit_message>
Andy added median graph
</commit_message>
<xml_diff>
--- a/project_2_presentation.pptx
+++ b/project_2_presentation.pptx
@@ -634,19 +634,7 @@
                 <a:ea typeface="+mn-ea"/>
                 <a:cs typeface="+mn-cs"/>
               </a:rPr>
-              <a:t>We considered several sampling designs and decided to stratify by day of week and hour of day.  Our initial simple random sample gave small subsamples for late evening/early morning flights, and omitted some hours entirely on some days.  By stratifying, we ensured we could estimate a value for all 168 (24 hours * 7 days) times.  We sampled roughly 2000 flights in each stratum, or the whole population if that was smaller. </a:t>
-            </a:r>
-            <a:r>
-              <a:rPr lang="en-US" sz="1200" kern="1200" dirty="0" smtClean="0">
-                <a:solidFill>
-                  <a:schemeClr val="tx1"/>
-                </a:solidFill>
-                <a:effectLst/>
-                <a:latin typeface="+mn-lt"/>
-                <a:ea typeface="+mn-ea"/>
-                <a:cs typeface="+mn-cs"/>
-              </a:rPr>
-              <a:t>  We used a</a:t>
+              <a:t>We considered several sampling designs and decided to stratify by day of week and hour of day.  Our initial simple random sample gave small subsamples for late evening/early morning flights, and omitted some hours entirely on some days.  By stratifying, we ensured we could estimate a value for all 168 (24 hours * 7 days) times.  We sampled roughly 2000 flights in each stratum, or the whole population if that was smaller.   We used a</a:t>
             </a:r>
             <a:r>
               <a:rPr lang="en-US" sz="1200" kern="1200" baseline="0" dirty="0" smtClean="0">
@@ -838,19 +826,7 @@
                 <a:ea typeface="+mn-ea"/>
                 <a:cs typeface="+mn-cs"/>
               </a:rPr>
-              <a:t>the </a:t>
-            </a:r>
-            <a:r>
-              <a:rPr lang="en-US" sz="1200" kern="1200" smtClean="0">
-                <a:solidFill>
-                  <a:schemeClr val="tx1"/>
-                </a:solidFill>
-                <a:effectLst/>
-                <a:latin typeface="+mn-lt"/>
-                <a:ea typeface="+mn-ea"/>
-                <a:cs typeface="+mn-cs"/>
-              </a:rPr>
-              <a:t>168 95% </a:t>
+              <a:t>the 168 95% </a:t>
             </a:r>
             <a:r>
               <a:rPr lang="en-US" sz="1200" kern="1200" dirty="0" smtClean="0">
@@ -4605,7 +4581,7 @@
         </p:nvSpPr>
         <p:spPr>
           <a:xfrm>
-            <a:off x="1600200" y="533400"/>
+            <a:off x="228600" y="533398"/>
             <a:ext cx="2971800" cy="2062103"/>
           </a:xfrm>
           <a:prstGeom prst="rect">
@@ -4654,8 +4630,8 @@
         </p:blipFill>
         <p:spPr>
           <a:xfrm>
-            <a:off x="4572000" y="3043245"/>
-            <a:ext cx="3510417" cy="3505193"/>
+            <a:off x="3048681" y="3047999"/>
+            <a:ext cx="2857557" cy="2853305"/>
           </a:xfrm>
           <a:prstGeom prst="rect">
             <a:avLst/>
@@ -4678,8 +4654,8 @@
         </p:blipFill>
         <p:spPr>
           <a:xfrm>
-            <a:off x="1371600" y="3043245"/>
-            <a:ext cx="3586729" cy="3581392"/>
+            <a:off x="0" y="3086100"/>
+            <a:ext cx="2819400" cy="2815205"/>
           </a:xfrm>
           <a:prstGeom prst="rect">
             <a:avLst/>
@@ -4702,8 +4678,56 @@
         </p:blipFill>
         <p:spPr>
           <a:xfrm>
-            <a:off x="4958328" y="381000"/>
+            <a:off x="3240025" y="233326"/>
             <a:ext cx="2666213" cy="2662245"/>
+          </a:xfrm>
+          <a:prstGeom prst="rect">
+            <a:avLst/>
+          </a:prstGeom>
+        </p:spPr>
+      </p:pic>
+      <p:pic>
+        <p:nvPicPr>
+          <p:cNvPr id="6" name="Picture 5"/>
+          <p:cNvPicPr>
+            <a:picLocks noChangeAspect="1"/>
+          </p:cNvPicPr>
+          <p:nvPr/>
+        </p:nvPicPr>
+        <p:blipFill>
+          <a:blip r:embed="rId5"/>
+          <a:stretch>
+            <a:fillRect/>
+          </a:stretch>
+        </p:blipFill>
+        <p:spPr>
+          <a:xfrm>
+            <a:off x="5906239" y="3086101"/>
+            <a:ext cx="2819400" cy="2815204"/>
+          </a:xfrm>
+          <a:prstGeom prst="rect">
+            <a:avLst/>
+          </a:prstGeom>
+        </p:spPr>
+      </p:pic>
+      <p:pic>
+        <p:nvPicPr>
+          <p:cNvPr id="5" name="Picture 4"/>
+          <p:cNvPicPr>
+            <a:picLocks noChangeAspect="1"/>
+          </p:cNvPicPr>
+          <p:nvPr/>
+        </p:nvPicPr>
+        <p:blipFill>
+          <a:blip r:embed="rId6"/>
+          <a:stretch>
+            <a:fillRect/>
+          </a:stretch>
+        </p:blipFill>
+        <p:spPr>
+          <a:xfrm>
+            <a:off x="5945863" y="233326"/>
+            <a:ext cx="2798106" cy="2509811"/>
           </a:xfrm>
           <a:prstGeom prst="rect">
             <a:avLst/>
@@ -4713,7 +4737,7 @@
     </p:spTree>
     <p:extLst>
       <p:ext uri="{BB962C8B-B14F-4D97-AF65-F5344CB8AC3E}">
-        <p14:creationId xmlns:p14="http://schemas.microsoft.com/office/powerpoint/2010/main" val="4150272596"/>
+        <p14:creationId xmlns:p14="http://schemas.microsoft.com/office/powerpoint/2010/main" val="2128237911"/>
       </p:ext>
     </p:extLst>
   </p:cSld>
@@ -5820,11 +5844,7 @@
             <a:pPr lvl="1"/>
             <a:r>
               <a:rPr lang="en-US" dirty="0" smtClean="0"/>
-              <a:t>About 2000 flights </a:t>
-            </a:r>
-            <a:r>
-              <a:rPr lang="en-US" dirty="0" smtClean="0"/>
-              <a:t>each (or population if smaller)</a:t>
+              <a:t>About 2000 flights each (or population if smaller)</a:t>
             </a:r>
             <a:endParaRPr lang="en-US" dirty="0"/>
           </a:p>

</xml_diff>

<commit_message>
added assumption about cancelled and diverted flights
</commit_message>
<xml_diff>
--- a/project_2_presentation.pptx
+++ b/project_2_presentation.pptx
@@ -121,7 +121,7 @@
   </p:defaultTextStyle>
   <p:extLst>
     <p:ext uri="{EFAFB233-063F-42B5-8137-9DF3F51BA10A}">
-      <p15:sldGuideLst xmlns:p15="http://schemas.microsoft.com/office/powerpoint/2012/main" xmlns="">
+      <p15:sldGuideLst xmlns="" xmlns:p15="http://schemas.microsoft.com/office/powerpoint/2012/main">
         <p15:guide id="1" orient="horz" pos="2160">
           <p15:clr>
             <a:srgbClr val="A4A3A4"/>
@@ -532,15 +532,7 @@
           <a:bodyPr/>
           <a:lstStyle/>
           <a:p>
-            <a:r>
-              <a:rPr lang="en-US" dirty="0" smtClean="0"/>
-              <a:t>Animations!</a:t>
-            </a:r>
-            <a:r>
-              <a:rPr lang="en-US" baseline="0" dirty="0" smtClean="0"/>
-              <a:t> </a:t>
-            </a:r>
-            <a:endParaRPr lang="en-US" dirty="0"/>
+            <a:endParaRPr lang="en-US"/>
           </a:p>
         </p:txBody>
       </p:sp>
@@ -561,7 +553,7 @@
           <a:p>
             <a:fld id="{3BF9693C-674C-4668-97DA-E7EB7AA52C3E}" type="slidenum">
               <a:rPr lang="en-US" smtClean="0"/>
-              <a:t>4</a:t>
+              <a:t>3</a:t>
             </a:fld>
             <a:endParaRPr lang="en-US"/>
           </a:p>
@@ -570,7 +562,7 @@
     </p:spTree>
     <p:extLst>
       <p:ext uri="{BB962C8B-B14F-4D97-AF65-F5344CB8AC3E}">
-        <p14:creationId xmlns:p14="http://schemas.microsoft.com/office/powerpoint/2010/main" val="4073369450"/>
+        <p14:creationId xmlns:p14="http://schemas.microsoft.com/office/powerpoint/2010/main" val="4142014755"/>
       </p:ext>
     </p:extLst>
   </p:cSld>
@@ -625,28 +617,12 @@
           <a:lstStyle/>
           <a:p>
             <a:r>
-              <a:rPr lang="en-US" sz="1200" kern="1200" dirty="0" smtClean="0">
-                <a:solidFill>
-                  <a:schemeClr val="tx1"/>
-                </a:solidFill>
-                <a:effectLst/>
-                <a:latin typeface="+mn-lt"/>
-                <a:ea typeface="+mn-ea"/>
-                <a:cs typeface="+mn-cs"/>
-              </a:rPr>
-              <a:t>We considered several sampling designs and decided to stratify by day of week and hour of day.  Our initial simple random sample gave small subsamples for late evening/early morning flights, and omitted some hours entirely on some days.  By stratifying, we ensured we could estimate a value for all 168 (24 hours * 7 days) times.  We sampled roughly 2000 flights in each stratum, or the whole population if that was smaller.   We used a</a:t>
-            </a:r>
-            <a:r>
-              <a:rPr lang="en-US" sz="1200" kern="1200" baseline="0" dirty="0" smtClean="0">
-                <a:solidFill>
-                  <a:schemeClr val="tx1"/>
-                </a:solidFill>
-                <a:effectLst/>
-                <a:latin typeface="+mn-lt"/>
-                <a:ea typeface="+mn-ea"/>
-                <a:cs typeface="+mn-cs"/>
-              </a:rPr>
-              <a:t> weighted sample by setting our sampling probability for each stratum (of size N) to be 2000/N.</a:t>
+              <a:rPr lang="en-US" dirty="0" smtClean="0"/>
+              <a:t>Animations!</a:t>
+            </a:r>
+            <a:r>
+              <a:rPr lang="en-US" baseline="0" dirty="0" smtClean="0"/>
+              <a:t> </a:t>
             </a:r>
             <a:endParaRPr lang="en-US" dirty="0"/>
           </a:p>
@@ -669,7 +645,7 @@
           <a:p>
             <a:fld id="{3BF9693C-674C-4668-97DA-E7EB7AA52C3E}" type="slidenum">
               <a:rPr lang="en-US" smtClean="0"/>
-              <a:t>5</a:t>
+              <a:t>4</a:t>
             </a:fld>
             <a:endParaRPr lang="en-US"/>
           </a:p>
@@ -678,7 +654,7 @@
     </p:spTree>
     <p:extLst>
       <p:ext uri="{BB962C8B-B14F-4D97-AF65-F5344CB8AC3E}">
-        <p14:creationId xmlns:p14="http://schemas.microsoft.com/office/powerpoint/2010/main" val="4163855932"/>
+        <p14:creationId xmlns:p14="http://schemas.microsoft.com/office/powerpoint/2010/main" val="4073369450"/>
       </p:ext>
     </p:extLst>
   </p:cSld>
@@ -732,6 +708,114 @@
           <a:bodyPr/>
           <a:lstStyle/>
           <a:p>
+            <a:r>
+              <a:rPr lang="en-US" sz="1200" kern="1200" dirty="0" smtClean="0">
+                <a:solidFill>
+                  <a:schemeClr val="tx1"/>
+                </a:solidFill>
+                <a:effectLst/>
+                <a:latin typeface="+mn-lt"/>
+                <a:ea typeface="+mn-ea"/>
+                <a:cs typeface="+mn-cs"/>
+              </a:rPr>
+              <a:t>We considered several sampling designs and decided to stratify by day of week and hour of day.  Our initial simple random sample gave small subsamples for late evening/early morning flights, and omitted some hours entirely on some days.  By stratifying, we ensured we could estimate a value for all 168 (24 hours * 7 days) times.  We sampled roughly 2000 flights in each stratum, or the whole population if that was smaller.   We used a</a:t>
+            </a:r>
+            <a:r>
+              <a:rPr lang="en-US" sz="1200" kern="1200" baseline="0" dirty="0" smtClean="0">
+                <a:solidFill>
+                  <a:schemeClr val="tx1"/>
+                </a:solidFill>
+                <a:effectLst/>
+                <a:latin typeface="+mn-lt"/>
+                <a:ea typeface="+mn-ea"/>
+                <a:cs typeface="+mn-cs"/>
+              </a:rPr>
+              <a:t> weighted sample by setting our sampling probability for each stratum (of size N) to be 2000/N.</a:t>
+            </a:r>
+            <a:endParaRPr lang="en-US" dirty="0"/>
+          </a:p>
+        </p:txBody>
+      </p:sp>
+      <p:sp>
+        <p:nvSpPr>
+          <p:cNvPr id="4" name="Slide Number Placeholder 3"/>
+          <p:cNvSpPr>
+            <a:spLocks noGrp="1"/>
+          </p:cNvSpPr>
+          <p:nvPr>
+            <p:ph type="sldNum" sz="quarter" idx="10"/>
+          </p:nvPr>
+        </p:nvSpPr>
+        <p:spPr/>
+        <p:txBody>
+          <a:bodyPr/>
+          <a:lstStyle/>
+          <a:p>
+            <a:fld id="{3BF9693C-674C-4668-97DA-E7EB7AA52C3E}" type="slidenum">
+              <a:rPr lang="en-US" smtClean="0"/>
+              <a:t>5</a:t>
+            </a:fld>
+            <a:endParaRPr lang="en-US"/>
+          </a:p>
+        </p:txBody>
+      </p:sp>
+    </p:spTree>
+    <p:extLst>
+      <p:ext uri="{BB962C8B-B14F-4D97-AF65-F5344CB8AC3E}">
+        <p14:creationId xmlns:p14="http://schemas.microsoft.com/office/powerpoint/2010/main" val="4163855932"/>
+      </p:ext>
+    </p:extLst>
+  </p:cSld>
+  <p:clrMapOvr>
+    <a:masterClrMapping/>
+  </p:clrMapOvr>
+</p:notes>
+</file>
+
+<file path=ppt/notesSlides/notesSlide4.xml><?xml version="1.0" encoding="utf-8"?>
+<p:notes xmlns:a="http://schemas.openxmlformats.org/drawingml/2006/main" xmlns:r="http://schemas.openxmlformats.org/officeDocument/2006/relationships" xmlns:p="http://schemas.openxmlformats.org/presentationml/2006/main">
+  <p:cSld>
+    <p:spTree>
+      <p:nvGrpSpPr>
+        <p:cNvPr id="1" name=""/>
+        <p:cNvGrpSpPr/>
+        <p:nvPr/>
+      </p:nvGrpSpPr>
+      <p:grpSpPr>
+        <a:xfrm>
+          <a:off x="0" y="0"/>
+          <a:ext cx="0" cy="0"/>
+          <a:chOff x="0" y="0"/>
+          <a:chExt cx="0" cy="0"/>
+        </a:xfrm>
+      </p:grpSpPr>
+      <p:sp>
+        <p:nvSpPr>
+          <p:cNvPr id="2" name="Slide Image Placeholder 1"/>
+          <p:cNvSpPr>
+            <a:spLocks noGrp="1" noRot="1" noChangeAspect="1"/>
+          </p:cNvSpPr>
+          <p:nvPr>
+            <p:ph type="sldImg"/>
+          </p:nvPr>
+        </p:nvSpPr>
+        <p:spPr/>
+      </p:sp>
+      <p:sp>
+        <p:nvSpPr>
+          <p:cNvPr id="3" name="Notes Placeholder 2"/>
+          <p:cNvSpPr>
+            <a:spLocks noGrp="1"/>
+          </p:cNvSpPr>
+          <p:nvPr>
+            <p:ph type="body" idx="1"/>
+          </p:nvPr>
+        </p:nvSpPr>
+        <p:spPr/>
+        <p:txBody>
+          <a:bodyPr/>
+          <a:lstStyle/>
+          <a:p>
             <a:pPr marL="0" marR="0" indent="0" algn="l" defTabSz="914400" rtl="0" eaLnBrk="1" fontAlgn="auto" latinLnBrk="0" hangingPunct="1">
               <a:lnSpc>
                 <a:spcPct val="100000"/>
@@ -882,7 +966,7 @@
 </p:notes>
 </file>
 
-<file path=ppt/notesSlides/notesSlide4.xml><?xml version="1.0" encoding="utf-8"?>
+<file path=ppt/notesSlides/notesSlide5.xml><?xml version="1.0" encoding="utf-8"?>
 <p:notes xmlns:a="http://schemas.openxmlformats.org/drawingml/2006/main" xmlns:r="http://schemas.openxmlformats.org/officeDocument/2006/relationships" xmlns:p="http://schemas.openxmlformats.org/presentationml/2006/main">
   <p:cSld>
     <p:spTree>
@@ -1020,7 +1104,7 @@
 </p:notes>
 </file>
 
-<file path=ppt/notesSlides/notesSlide5.xml><?xml version="1.0" encoding="utf-8"?>
+<file path=ppt/notesSlides/notesSlide6.xml><?xml version="1.0" encoding="utf-8"?>
 <p:notes xmlns:a="http://schemas.openxmlformats.org/drawingml/2006/main" xmlns:r="http://schemas.openxmlformats.org/officeDocument/2006/relationships" xmlns:p="http://schemas.openxmlformats.org/presentationml/2006/main">
   <p:cSld>
     <p:spTree>
@@ -5180,7 +5264,9 @@
         </p:nvSpPr>
         <p:spPr/>
         <p:txBody>
-          <a:bodyPr/>
+          <a:bodyPr>
+            <a:normAutofit lnSpcReduction="10000"/>
+          </a:bodyPr>
           <a:lstStyle/>
           <a:p>
             <a:r>
@@ -5203,7 +5289,20 @@
           <a:p>
             <a:r>
               <a:rPr lang="en-US" dirty="0" smtClean="0"/>
-              <a:t>Made negative times 	   zero</a:t>
+              <a:t>Made negative times 	   </a:t>
+            </a:r>
+            <a:r>
+              <a:rPr lang="en-US" dirty="0" smtClean="0"/>
+              <a:t>zero</a:t>
+            </a:r>
+          </a:p>
+          <a:p>
+            <a:endParaRPr lang="en-US" dirty="0" smtClean="0"/>
+          </a:p>
+          <a:p>
+            <a:r>
+              <a:rPr lang="en-US" dirty="0" smtClean="0"/>
+              <a:t>Removed cancelled or diverted flights</a:t>
             </a:r>
             <a:endParaRPr lang="en-US" dirty="0"/>
           </a:p>
@@ -5217,7 +5316,7 @@
         </p:nvCxnSpPr>
         <p:spPr>
           <a:xfrm>
-            <a:off x="4495800" y="4728882"/>
+            <a:off x="4495800" y="4419600"/>
             <a:ext cx="762000" cy="0"/>
           </a:xfrm>
           <a:prstGeom prst="straightConnector1">
@@ -5496,15 +5595,7 @@
           <a:p>
             <a:r>
               <a:rPr lang="en-US" sz="2000" dirty="0" smtClean="0"/>
-              <a:t>-Wednesday 5:00 </a:t>
-            </a:r>
-            <a:r>
-              <a:rPr lang="en-US" sz="2000" dirty="0" smtClean="0"/>
-              <a:t>am </a:t>
-            </a:r>
-            <a:r>
-              <a:rPr lang="en-US" sz="2000" dirty="0" smtClean="0"/>
-              <a:t>~23%</a:t>
+              <a:t>-Wednesday 5:00 am ~23%</a:t>
             </a:r>
           </a:p>
           <a:p>
@@ -5849,11 +5940,7 @@
             </a:r>
             <a:r>
               <a:rPr lang="en-US" smtClean="0"/>
-              <a:t>168 </a:t>
-            </a:r>
-            <a:r>
-              <a:rPr lang="en-US" smtClean="0"/>
-              <a:t>strata </a:t>
+              <a:t>168 strata </a:t>
             </a:r>
             <a:endParaRPr lang="en-US" dirty="0" smtClean="0"/>
           </a:p>

</xml_diff>